<commit_message>
bissl fü presentation -> muas nur mehr sche gmocht wean
</commit_message>
<xml_diff>
--- a/pro3praes.pptx
+++ b/pro3praes.pptx
@@ -9,10 +9,11 @@
     <p:sldId id="257" r:id="rId3"/>
     <p:sldId id="261" r:id="rId4"/>
     <p:sldId id="262" r:id="rId5"/>
-    <p:sldId id="258" r:id="rId6"/>
-    <p:sldId id="259" r:id="rId7"/>
+    <p:sldId id="259" r:id="rId6"/>
+    <p:sldId id="258" r:id="rId7"/>
     <p:sldId id="260" r:id="rId8"/>
     <p:sldId id="263" r:id="rId9"/>
+    <p:sldId id="264" r:id="rId10"/>
   </p:sldIdLst>
   <p:sldSz cx="12192000" cy="6858000"/>
   <p:notesSz cx="6858000" cy="9144000"/>
@@ -111,7 +112,16 @@
       </a:defRPr>
     </a:lvl9pPr>
   </p:defaultTextStyle>
+  <p:extLst>
+    <p:ext uri="{EFAFB233-063F-42B5-8137-9DF3F51BA10A}">
+      <p15:sldGuideLst xmlns:p15="http://schemas.microsoft.com/office/powerpoint/2012/main"/>
+    </p:ext>
+  </p:extLst>
 </p:presentation>
+</file>
+
+<file path=ppt/revisionInfo.xml><?xml version="1.0" encoding="utf-8"?>
+<p1510:revInfo xmlns:a="http://schemas.openxmlformats.org/drawingml/2006/main" xmlns:r="http://schemas.openxmlformats.org/officeDocument/2006/relationships" xmlns:p1510="http://schemas.microsoft.com/office/powerpoint/2015/10/main"/>
 </file>
 
 <file path=ppt/slideLayouts/slideLayout1.xml><?xml version="1.0" encoding="utf-8"?>
@@ -3560,7 +3570,291 @@
           <a:bodyPr/>
           <a:lstStyle/>
           <a:p>
-            <a:endParaRPr lang="de-AT" dirty="0"/>
+            <a:r>
+              <a:rPr lang="de-AT" dirty="0">
+                <a:solidFill>
+                  <a:schemeClr val="bg1"/>
+                </a:solidFill>
+              </a:rPr>
+              <a:t>Jeder </a:t>
+            </a:r>
+            <a:r>
+              <a:rPr lang="de-AT" dirty="0" err="1">
+                <a:solidFill>
+                  <a:schemeClr val="bg1"/>
+                </a:solidFill>
+              </a:rPr>
+              <a:t>hod</a:t>
+            </a:r>
+            <a:r>
+              <a:rPr lang="de-AT" dirty="0">
+                <a:solidFill>
+                  <a:schemeClr val="bg1"/>
+                </a:solidFill>
+              </a:rPr>
+              <a:t> 20 tausend </a:t>
+            </a:r>
+            <a:r>
+              <a:rPr lang="de-AT" dirty="0" err="1">
+                <a:solidFill>
+                  <a:schemeClr val="bg1"/>
+                </a:solidFill>
+              </a:rPr>
+              <a:t>accounts</a:t>
+            </a:r>
+            <a:endParaRPr lang="de-AT" dirty="0">
+              <a:solidFill>
+                <a:schemeClr val="bg1"/>
+              </a:solidFill>
+            </a:endParaRPr>
+          </a:p>
+          <a:p>
+            <a:r>
+              <a:rPr lang="de-AT" dirty="0">
+                <a:solidFill>
+                  <a:schemeClr val="bg1"/>
+                </a:solidFill>
+              </a:rPr>
+              <a:t>Jeder </a:t>
+            </a:r>
+            <a:r>
+              <a:rPr lang="de-AT" dirty="0" err="1">
+                <a:solidFill>
+                  <a:schemeClr val="bg1"/>
+                </a:solidFill>
+              </a:rPr>
+              <a:t>muas</a:t>
+            </a:r>
+            <a:r>
+              <a:rPr lang="de-AT" dirty="0">
+                <a:solidFill>
+                  <a:schemeClr val="bg1"/>
+                </a:solidFill>
+              </a:rPr>
+              <a:t> </a:t>
+            </a:r>
+            <a:r>
+              <a:rPr lang="de-AT" dirty="0" err="1">
+                <a:solidFill>
+                  <a:schemeClr val="bg1"/>
+                </a:solidFill>
+              </a:rPr>
+              <a:t>söwa</a:t>
+            </a:r>
+            <a:r>
+              <a:rPr lang="de-AT" dirty="0">
+                <a:solidFill>
+                  <a:schemeClr val="bg1"/>
+                </a:solidFill>
+              </a:rPr>
+              <a:t> wissen wo er wie hast</a:t>
+            </a:r>
+          </a:p>
+          <a:p>
+            <a:r>
+              <a:rPr lang="de-AT" dirty="0" err="1">
+                <a:solidFill>
+                  <a:schemeClr val="bg1"/>
+                </a:solidFill>
+              </a:rPr>
+              <a:t>Owa</a:t>
+            </a:r>
+            <a:r>
+              <a:rPr lang="de-AT" dirty="0">
+                <a:solidFill>
+                  <a:schemeClr val="bg1"/>
+                </a:solidFill>
+              </a:rPr>
+              <a:t> seine </a:t>
+            </a:r>
+            <a:r>
+              <a:rPr lang="de-AT" dirty="0" err="1">
+                <a:solidFill>
+                  <a:schemeClr val="bg1"/>
+                </a:solidFill>
+              </a:rPr>
+              <a:t>freind</a:t>
+            </a:r>
+            <a:r>
+              <a:rPr lang="de-AT" dirty="0">
+                <a:solidFill>
+                  <a:schemeClr val="bg1"/>
+                </a:solidFill>
+              </a:rPr>
+              <a:t> </a:t>
+            </a:r>
+            <a:r>
+              <a:rPr lang="de-AT" dirty="0" err="1">
+                <a:solidFill>
+                  <a:schemeClr val="bg1"/>
+                </a:solidFill>
+              </a:rPr>
+              <a:t>miassn</a:t>
+            </a:r>
+            <a:r>
+              <a:rPr lang="de-AT" dirty="0">
+                <a:solidFill>
+                  <a:schemeClr val="bg1"/>
+                </a:solidFill>
+              </a:rPr>
+              <a:t> na </a:t>
+            </a:r>
+            <a:r>
+              <a:rPr lang="de-AT" dirty="0" err="1">
+                <a:solidFill>
+                  <a:schemeClr val="bg1"/>
+                </a:solidFill>
+              </a:rPr>
+              <a:t>findn</a:t>
+            </a:r>
+            <a:r>
+              <a:rPr lang="de-AT" dirty="0">
+                <a:solidFill>
+                  <a:schemeClr val="bg1"/>
+                </a:solidFill>
+              </a:rPr>
+              <a:t> </a:t>
+            </a:r>
+            <a:r>
+              <a:rPr lang="de-AT" dirty="0" err="1">
+                <a:solidFill>
+                  <a:schemeClr val="bg1"/>
+                </a:solidFill>
+              </a:rPr>
+              <a:t>kina</a:t>
+            </a:r>
+            <a:endParaRPr lang="de-AT" dirty="0">
+              <a:solidFill>
+                <a:schemeClr val="bg1"/>
+              </a:solidFill>
+            </a:endParaRPr>
+          </a:p>
+          <a:p>
+            <a:r>
+              <a:rPr lang="de-AT" dirty="0" err="1">
+                <a:solidFill>
+                  <a:schemeClr val="bg1"/>
+                </a:solidFill>
+              </a:rPr>
+              <a:t>Owa</a:t>
+            </a:r>
+            <a:r>
+              <a:rPr lang="de-AT" dirty="0">
+                <a:solidFill>
+                  <a:schemeClr val="bg1"/>
+                </a:solidFill>
+              </a:rPr>
+              <a:t> jedes </a:t>
+            </a:r>
+            <a:r>
+              <a:rPr lang="de-AT" dirty="0" err="1">
+                <a:solidFill>
+                  <a:schemeClr val="bg1"/>
+                </a:solidFill>
+              </a:rPr>
+              <a:t>moi</a:t>
+            </a:r>
+            <a:r>
+              <a:rPr lang="de-AT" dirty="0">
+                <a:solidFill>
+                  <a:schemeClr val="bg1"/>
+                </a:solidFill>
+              </a:rPr>
+              <a:t> </a:t>
+            </a:r>
+            <a:r>
+              <a:rPr lang="de-AT" dirty="0" err="1">
+                <a:solidFill>
+                  <a:schemeClr val="bg1"/>
+                </a:solidFill>
+              </a:rPr>
+              <a:t>olle</a:t>
+            </a:r>
+            <a:r>
+              <a:rPr lang="de-AT" dirty="0">
+                <a:solidFill>
+                  <a:schemeClr val="bg1"/>
+                </a:solidFill>
+              </a:rPr>
+              <a:t> seine </a:t>
+            </a:r>
+            <a:r>
+              <a:rPr lang="de-AT" dirty="0" err="1">
+                <a:solidFill>
+                  <a:schemeClr val="bg1"/>
+                </a:solidFill>
+              </a:rPr>
+              <a:t>freind</a:t>
+            </a:r>
+            <a:r>
+              <a:rPr lang="de-AT" dirty="0">
+                <a:solidFill>
+                  <a:schemeClr val="bg1"/>
+                </a:solidFill>
+              </a:rPr>
+              <a:t> </a:t>
+            </a:r>
+            <a:r>
+              <a:rPr lang="de-AT" dirty="0" err="1">
+                <a:solidFill>
+                  <a:schemeClr val="bg1"/>
+                </a:solidFill>
+              </a:rPr>
+              <a:t>auschreim</a:t>
+            </a:r>
+            <a:r>
+              <a:rPr lang="de-AT" dirty="0">
+                <a:solidFill>
+                  <a:schemeClr val="bg1"/>
+                </a:solidFill>
+              </a:rPr>
+              <a:t> wie de jetzt genau wo </a:t>
+            </a:r>
+            <a:r>
+              <a:rPr lang="de-AT" dirty="0" err="1">
+                <a:solidFill>
+                  <a:schemeClr val="bg1"/>
+                </a:solidFill>
+              </a:rPr>
+              <a:t>hassn</a:t>
+            </a:r>
+            <a:r>
+              <a:rPr lang="de-AT" dirty="0">
+                <a:solidFill>
+                  <a:schemeClr val="bg1"/>
+                </a:solidFill>
+              </a:rPr>
+              <a:t>, de zeit </a:t>
+            </a:r>
+            <a:r>
+              <a:rPr lang="de-AT" dirty="0" err="1">
+                <a:solidFill>
+                  <a:schemeClr val="bg1"/>
+                </a:solidFill>
+              </a:rPr>
+              <a:t>hod</a:t>
+            </a:r>
+            <a:r>
+              <a:rPr lang="de-AT" dirty="0">
+                <a:solidFill>
+                  <a:schemeClr val="bg1"/>
+                </a:solidFill>
+              </a:rPr>
+              <a:t> doch echt </a:t>
+            </a:r>
+            <a:r>
+              <a:rPr lang="de-AT" dirty="0" err="1">
+                <a:solidFill>
+                  <a:schemeClr val="bg1"/>
+                </a:solidFill>
+              </a:rPr>
+              <a:t>kana</a:t>
+            </a:r>
+            <a:endParaRPr lang="de-AT" dirty="0">
+              <a:solidFill>
+                <a:schemeClr val="bg1"/>
+              </a:solidFill>
+            </a:endParaRPr>
           </a:p>
         </p:txBody>
       </p:sp>
@@ -3649,7 +3943,414 @@
           <a:bodyPr/>
           <a:lstStyle/>
           <a:p>
-            <a:endParaRPr lang="de-AT"/>
+            <a:r>
+              <a:rPr lang="de-AT" dirty="0">
+                <a:solidFill>
+                  <a:schemeClr val="bg1"/>
+                </a:solidFill>
+              </a:rPr>
+              <a:t>Ma </a:t>
+            </a:r>
+            <a:r>
+              <a:rPr lang="de-AT" dirty="0" err="1">
+                <a:solidFill>
+                  <a:schemeClr val="bg1"/>
+                </a:solidFill>
+              </a:rPr>
+              <a:t>mocht</a:t>
+            </a:r>
+            <a:r>
+              <a:rPr lang="de-AT" dirty="0">
+                <a:solidFill>
+                  <a:schemeClr val="bg1"/>
+                </a:solidFill>
+              </a:rPr>
+              <a:t> </a:t>
+            </a:r>
+            <a:r>
+              <a:rPr lang="de-AT" dirty="0" err="1">
+                <a:solidFill>
+                  <a:schemeClr val="bg1"/>
+                </a:solidFill>
+              </a:rPr>
+              <a:t>whoople</a:t>
+            </a:r>
+            <a:endParaRPr lang="de-AT" dirty="0">
+              <a:solidFill>
+                <a:schemeClr val="bg1"/>
+              </a:solidFill>
+            </a:endParaRPr>
+          </a:p>
+          <a:p>
+            <a:r>
+              <a:rPr lang="de-AT" dirty="0" err="1">
+                <a:solidFill>
+                  <a:schemeClr val="bg1"/>
+                </a:solidFill>
+              </a:rPr>
+              <a:t>Social</a:t>
+            </a:r>
+            <a:r>
+              <a:rPr lang="de-AT" dirty="0">
+                <a:solidFill>
+                  <a:schemeClr val="bg1"/>
+                </a:solidFill>
+              </a:rPr>
+              <a:t> </a:t>
+            </a:r>
+            <a:r>
+              <a:rPr lang="de-AT" dirty="0" err="1">
+                <a:solidFill>
+                  <a:schemeClr val="bg1"/>
+                </a:solidFill>
+              </a:rPr>
+              <a:t>media</a:t>
+            </a:r>
+            <a:r>
+              <a:rPr lang="de-AT" dirty="0">
+                <a:solidFill>
+                  <a:schemeClr val="bg1"/>
+                </a:solidFill>
+              </a:rPr>
+              <a:t> </a:t>
+            </a:r>
+            <a:r>
+              <a:rPr lang="de-AT" dirty="0" err="1">
+                <a:solidFill>
+                  <a:schemeClr val="bg1"/>
+                </a:solidFill>
+              </a:rPr>
+              <a:t>collection</a:t>
+            </a:r>
+            <a:r>
+              <a:rPr lang="de-AT" dirty="0">
+                <a:solidFill>
+                  <a:schemeClr val="bg1"/>
+                </a:solidFill>
+              </a:rPr>
+              <a:t> wo </a:t>
+            </a:r>
+            <a:r>
+              <a:rPr lang="de-AT" dirty="0" err="1">
+                <a:solidFill>
+                  <a:schemeClr val="bg1"/>
+                </a:solidFill>
+              </a:rPr>
+              <a:t>ma</a:t>
+            </a:r>
+            <a:r>
+              <a:rPr lang="de-AT" dirty="0">
+                <a:solidFill>
+                  <a:schemeClr val="bg1"/>
+                </a:solidFill>
+              </a:rPr>
+              <a:t> seine </a:t>
+            </a:r>
+            <a:r>
+              <a:rPr lang="de-AT" dirty="0" err="1">
+                <a:solidFill>
+                  <a:schemeClr val="bg1"/>
+                </a:solidFill>
+              </a:rPr>
+              <a:t>freind</a:t>
+            </a:r>
+            <a:r>
+              <a:rPr lang="de-AT" dirty="0">
+                <a:solidFill>
+                  <a:schemeClr val="bg1"/>
+                </a:solidFill>
+              </a:rPr>
+              <a:t> </a:t>
+            </a:r>
+            <a:r>
+              <a:rPr lang="de-AT" dirty="0" err="1">
+                <a:solidFill>
+                  <a:schemeClr val="bg1"/>
+                </a:solidFill>
+              </a:rPr>
+              <a:t>adden</a:t>
+            </a:r>
+            <a:r>
+              <a:rPr lang="de-AT" dirty="0">
+                <a:solidFill>
+                  <a:schemeClr val="bg1"/>
+                </a:solidFill>
+              </a:rPr>
+              <a:t> kau</a:t>
+            </a:r>
+          </a:p>
+          <a:p>
+            <a:r>
+              <a:rPr lang="de-AT" dirty="0">
+                <a:solidFill>
+                  <a:schemeClr val="bg1"/>
+                </a:solidFill>
+              </a:rPr>
+              <a:t>Ma </a:t>
+            </a:r>
+            <a:r>
+              <a:rPr lang="de-AT" dirty="0" err="1">
+                <a:solidFill>
+                  <a:schemeClr val="bg1"/>
+                </a:solidFill>
+              </a:rPr>
+              <a:t>kaun</a:t>
+            </a:r>
+            <a:r>
+              <a:rPr lang="de-AT" dirty="0">
+                <a:solidFill>
+                  <a:schemeClr val="bg1"/>
+                </a:solidFill>
+              </a:rPr>
+              <a:t> si von jedem </a:t>
+            </a:r>
+            <a:r>
+              <a:rPr lang="de-AT" dirty="0" err="1">
+                <a:solidFill>
+                  <a:schemeClr val="bg1"/>
+                </a:solidFill>
+              </a:rPr>
+              <a:t>freind</a:t>
+            </a:r>
+            <a:r>
+              <a:rPr lang="de-AT" dirty="0">
+                <a:solidFill>
+                  <a:schemeClr val="bg1"/>
+                </a:solidFill>
+              </a:rPr>
+              <a:t> des </a:t>
+            </a:r>
+            <a:r>
+              <a:rPr lang="de-AT" dirty="0" err="1">
+                <a:solidFill>
+                  <a:schemeClr val="bg1"/>
+                </a:solidFill>
+              </a:rPr>
+              <a:t>profil</a:t>
+            </a:r>
+            <a:r>
+              <a:rPr lang="de-AT" dirty="0">
+                <a:solidFill>
+                  <a:schemeClr val="bg1"/>
+                </a:solidFill>
+              </a:rPr>
+              <a:t> </a:t>
+            </a:r>
+            <a:r>
+              <a:rPr lang="de-AT" dirty="0" err="1">
+                <a:solidFill>
+                  <a:schemeClr val="bg1"/>
+                </a:solidFill>
+              </a:rPr>
+              <a:t>auzang</a:t>
+            </a:r>
+            <a:r>
+              <a:rPr lang="de-AT" dirty="0">
+                <a:solidFill>
+                  <a:schemeClr val="bg1"/>
+                </a:solidFill>
+              </a:rPr>
+              <a:t> </a:t>
+            </a:r>
+            <a:r>
+              <a:rPr lang="de-AT" dirty="0" err="1">
+                <a:solidFill>
+                  <a:schemeClr val="bg1"/>
+                </a:solidFill>
+              </a:rPr>
+              <a:t>lossn</a:t>
+            </a:r>
+            <a:r>
+              <a:rPr lang="de-AT" dirty="0">
+                <a:solidFill>
+                  <a:schemeClr val="bg1"/>
+                </a:solidFill>
+              </a:rPr>
+              <a:t> und </a:t>
+            </a:r>
+            <a:r>
+              <a:rPr lang="de-AT" dirty="0" err="1">
+                <a:solidFill>
+                  <a:schemeClr val="bg1"/>
+                </a:solidFill>
+              </a:rPr>
+              <a:t>siacht</a:t>
+            </a:r>
+            <a:r>
+              <a:rPr lang="de-AT" dirty="0">
+                <a:solidFill>
+                  <a:schemeClr val="bg1"/>
+                </a:solidFill>
+              </a:rPr>
+              <a:t> direkt, auf </a:t>
+            </a:r>
+            <a:r>
+              <a:rPr lang="de-AT" dirty="0" err="1">
+                <a:solidFill>
+                  <a:schemeClr val="bg1"/>
+                </a:solidFill>
+              </a:rPr>
+              <a:t>wöcher</a:t>
+            </a:r>
+            <a:r>
+              <a:rPr lang="de-AT" dirty="0">
+                <a:solidFill>
+                  <a:schemeClr val="bg1"/>
+                </a:solidFill>
+              </a:rPr>
+              <a:t> </a:t>
+            </a:r>
+            <a:r>
+              <a:rPr lang="de-AT" dirty="0" err="1">
+                <a:solidFill>
+                  <a:schemeClr val="bg1"/>
+                </a:solidFill>
+              </a:rPr>
+              <a:t>seitn</a:t>
+            </a:r>
+            <a:r>
+              <a:rPr lang="de-AT" dirty="0">
+                <a:solidFill>
+                  <a:schemeClr val="bg1"/>
+                </a:solidFill>
+              </a:rPr>
+              <a:t> der </a:t>
+            </a:r>
+            <a:r>
+              <a:rPr lang="de-AT" dirty="0" err="1">
+                <a:solidFill>
+                  <a:schemeClr val="bg1"/>
+                </a:solidFill>
+              </a:rPr>
+              <a:t>dude</a:t>
+            </a:r>
+            <a:r>
+              <a:rPr lang="de-AT" dirty="0">
+                <a:solidFill>
+                  <a:schemeClr val="bg1"/>
+                </a:solidFill>
+              </a:rPr>
+              <a:t> wie hast und </a:t>
+            </a:r>
+            <a:r>
+              <a:rPr lang="de-AT" dirty="0" err="1">
+                <a:solidFill>
+                  <a:schemeClr val="bg1"/>
+                </a:solidFill>
+              </a:rPr>
+              <a:t>kaun</a:t>
+            </a:r>
+            <a:r>
+              <a:rPr lang="de-AT" dirty="0">
+                <a:solidFill>
+                  <a:schemeClr val="bg1"/>
+                </a:solidFill>
+              </a:rPr>
+              <a:t> </a:t>
+            </a:r>
+            <a:r>
+              <a:rPr lang="de-AT" dirty="0" err="1">
+                <a:solidFill>
+                  <a:schemeClr val="bg1"/>
+                </a:solidFill>
+              </a:rPr>
+              <a:t>nan</a:t>
+            </a:r>
+            <a:r>
+              <a:rPr lang="de-AT" dirty="0">
+                <a:solidFill>
+                  <a:schemeClr val="bg1"/>
+                </a:solidFill>
+              </a:rPr>
+              <a:t> direkt über an link bei </a:t>
+            </a:r>
+            <a:r>
+              <a:rPr lang="de-AT" dirty="0" err="1">
+                <a:solidFill>
+                  <a:schemeClr val="bg1"/>
+                </a:solidFill>
+              </a:rPr>
+              <a:t>whoople</a:t>
+            </a:r>
+            <a:r>
+              <a:rPr lang="de-AT" dirty="0">
+                <a:solidFill>
+                  <a:schemeClr val="bg1"/>
+                </a:solidFill>
+              </a:rPr>
+              <a:t> </a:t>
+            </a:r>
+            <a:r>
+              <a:rPr lang="de-AT" dirty="0" err="1">
+                <a:solidFill>
+                  <a:schemeClr val="bg1"/>
+                </a:solidFill>
+              </a:rPr>
+              <a:t>adden</a:t>
+            </a:r>
+            <a:endParaRPr lang="de-AT" dirty="0">
+              <a:solidFill>
+                <a:schemeClr val="bg1"/>
+              </a:solidFill>
+            </a:endParaRPr>
+          </a:p>
+          <a:p>
+            <a:r>
+              <a:rPr lang="de-AT" dirty="0">
+                <a:solidFill>
+                  <a:schemeClr val="bg1"/>
+                </a:solidFill>
+              </a:rPr>
+              <a:t>Es </a:t>
+            </a:r>
+            <a:r>
+              <a:rPr lang="de-AT" dirty="0" err="1">
+                <a:solidFill>
+                  <a:schemeClr val="bg1"/>
+                </a:solidFill>
+              </a:rPr>
+              <a:t>is</a:t>
+            </a:r>
+            <a:r>
+              <a:rPr lang="de-AT" dirty="0">
+                <a:solidFill>
+                  <a:schemeClr val="bg1"/>
+                </a:solidFill>
+              </a:rPr>
+              <a:t> </a:t>
+            </a:r>
+            <a:r>
+              <a:rPr lang="de-AT" dirty="0" err="1">
+                <a:solidFill>
+                  <a:schemeClr val="bg1"/>
+                </a:solidFill>
+              </a:rPr>
+              <a:t>afoch</a:t>
+            </a:r>
+            <a:r>
+              <a:rPr lang="de-AT" dirty="0">
+                <a:solidFill>
+                  <a:schemeClr val="bg1"/>
+                </a:solidFill>
+              </a:rPr>
+              <a:t> </a:t>
+            </a:r>
+            <a:r>
+              <a:rPr lang="de-AT" dirty="0" err="1">
+                <a:solidFill>
+                  <a:schemeClr val="bg1"/>
+                </a:solidFill>
+              </a:rPr>
+              <a:t>ez</a:t>
+            </a:r>
+            <a:r>
+              <a:rPr lang="de-AT" dirty="0">
+                <a:solidFill>
+                  <a:schemeClr val="bg1"/>
+                </a:solidFill>
+              </a:rPr>
+              <a:t> und geil</a:t>
+            </a:r>
           </a:p>
         </p:txBody>
       </p:sp>
@@ -3738,7 +4439,318 @@
           <a:bodyPr/>
           <a:lstStyle/>
           <a:p>
-            <a:endParaRPr lang="de-AT"/>
+            <a:r>
+              <a:rPr lang="de-AT" dirty="0">
+                <a:solidFill>
+                  <a:schemeClr val="bg1"/>
+                </a:solidFill>
+              </a:rPr>
+              <a:t>Video </a:t>
+            </a:r>
+            <a:r>
+              <a:rPr lang="de-AT" dirty="0" err="1">
+                <a:solidFill>
+                  <a:schemeClr val="bg1"/>
+                </a:solidFill>
+              </a:rPr>
+              <a:t>capture</a:t>
+            </a:r>
+            <a:r>
+              <a:rPr lang="de-AT" dirty="0">
+                <a:solidFill>
+                  <a:schemeClr val="bg1"/>
+                </a:solidFill>
+              </a:rPr>
+              <a:t> wo </a:t>
+            </a:r>
+            <a:r>
+              <a:rPr lang="de-AT" dirty="0" err="1">
+                <a:solidFill>
+                  <a:schemeClr val="bg1"/>
+                </a:solidFill>
+              </a:rPr>
+              <a:t>ois</a:t>
+            </a:r>
+            <a:r>
+              <a:rPr lang="de-AT" dirty="0">
+                <a:solidFill>
+                  <a:schemeClr val="bg1"/>
+                </a:solidFill>
+              </a:rPr>
+              <a:t> </a:t>
+            </a:r>
+            <a:r>
+              <a:rPr lang="de-AT" dirty="0" err="1">
+                <a:solidFill>
+                  <a:schemeClr val="bg1"/>
+                </a:solidFill>
+              </a:rPr>
+              <a:t>voi</a:t>
+            </a:r>
+            <a:r>
+              <a:rPr lang="de-AT" dirty="0">
+                <a:solidFill>
+                  <a:schemeClr val="bg1"/>
+                </a:solidFill>
+              </a:rPr>
+              <a:t> nice </a:t>
+            </a:r>
+            <a:r>
+              <a:rPr lang="de-AT" dirty="0" err="1">
+                <a:solidFill>
+                  <a:schemeClr val="bg1"/>
+                </a:solidFill>
+              </a:rPr>
+              <a:t>ausschaud</a:t>
+            </a:r>
+            <a:endParaRPr lang="de-AT" dirty="0">
+              <a:solidFill>
+                <a:schemeClr val="bg1"/>
+              </a:solidFill>
+            </a:endParaRPr>
+          </a:p>
+          <a:p>
+            <a:pPr lvl="1"/>
+            <a:r>
+              <a:rPr lang="de-AT" dirty="0" err="1">
+                <a:solidFill>
+                  <a:schemeClr val="bg1"/>
+                </a:solidFill>
+              </a:rPr>
+              <a:t>Whoople</a:t>
+            </a:r>
+            <a:r>
+              <a:rPr lang="de-AT" dirty="0">
+                <a:solidFill>
+                  <a:schemeClr val="bg1"/>
+                </a:solidFill>
+              </a:rPr>
+              <a:t> </a:t>
+            </a:r>
+            <a:r>
+              <a:rPr lang="de-AT" dirty="0" err="1">
+                <a:solidFill>
+                  <a:schemeClr val="bg1"/>
+                </a:solidFill>
+              </a:rPr>
+              <a:t>adden</a:t>
+            </a:r>
+            <a:endParaRPr lang="de-AT" dirty="0">
+              <a:solidFill>
+                <a:schemeClr val="bg1"/>
+              </a:solidFill>
+            </a:endParaRPr>
+          </a:p>
+          <a:p>
+            <a:pPr lvl="1"/>
+            <a:r>
+              <a:rPr lang="de-AT" dirty="0" err="1">
+                <a:solidFill>
+                  <a:schemeClr val="bg1"/>
+                </a:solidFill>
+              </a:rPr>
+              <a:t>Freind</a:t>
+            </a:r>
+            <a:r>
+              <a:rPr lang="de-AT" dirty="0">
+                <a:solidFill>
+                  <a:schemeClr val="bg1"/>
+                </a:solidFill>
+              </a:rPr>
+              <a:t> </a:t>
+            </a:r>
+            <a:r>
+              <a:rPr lang="de-AT" dirty="0" err="1">
+                <a:solidFill>
+                  <a:schemeClr val="bg1"/>
+                </a:solidFill>
+              </a:rPr>
+              <a:t>adden</a:t>
+            </a:r>
+            <a:endParaRPr lang="de-AT" dirty="0">
+              <a:solidFill>
+                <a:schemeClr val="bg1"/>
+              </a:solidFill>
+            </a:endParaRPr>
+          </a:p>
+          <a:p>
+            <a:pPr lvl="1"/>
+            <a:r>
+              <a:rPr lang="de-AT" dirty="0">
+                <a:solidFill>
+                  <a:schemeClr val="bg1"/>
+                </a:solidFill>
+              </a:rPr>
+              <a:t>Vom </a:t>
+            </a:r>
+            <a:r>
+              <a:rPr lang="de-AT" dirty="0" err="1">
+                <a:solidFill>
+                  <a:schemeClr val="bg1"/>
+                </a:solidFill>
+              </a:rPr>
+              <a:t>freind</a:t>
+            </a:r>
+            <a:r>
+              <a:rPr lang="de-AT" dirty="0">
+                <a:solidFill>
+                  <a:schemeClr val="bg1"/>
+                </a:solidFill>
+              </a:rPr>
+              <a:t> de </a:t>
+            </a:r>
+            <a:r>
+              <a:rPr lang="de-AT" dirty="0" err="1">
+                <a:solidFill>
+                  <a:schemeClr val="bg1"/>
+                </a:solidFill>
+              </a:rPr>
+              <a:t>whooples</a:t>
+            </a:r>
+            <a:r>
+              <a:rPr lang="de-AT" dirty="0">
+                <a:solidFill>
+                  <a:schemeClr val="bg1"/>
+                </a:solidFill>
+              </a:rPr>
+              <a:t> </a:t>
+            </a:r>
+            <a:r>
+              <a:rPr lang="de-AT" dirty="0" err="1">
+                <a:solidFill>
+                  <a:schemeClr val="bg1"/>
+                </a:solidFill>
+              </a:rPr>
+              <a:t>auschaun</a:t>
+            </a:r>
+            <a:endParaRPr lang="de-AT" dirty="0">
+              <a:solidFill>
+                <a:schemeClr val="bg1"/>
+              </a:solidFill>
+            </a:endParaRPr>
+          </a:p>
+          <a:p>
+            <a:pPr lvl="1"/>
+            <a:r>
+              <a:rPr lang="de-AT" dirty="0">
+                <a:solidFill>
+                  <a:schemeClr val="bg1"/>
+                </a:solidFill>
+              </a:rPr>
+              <a:t>Auf a </a:t>
+            </a:r>
+            <a:r>
+              <a:rPr lang="de-AT" dirty="0" err="1">
+                <a:solidFill>
+                  <a:schemeClr val="bg1"/>
+                </a:solidFill>
+              </a:rPr>
+              <a:t>whoople</a:t>
+            </a:r>
+            <a:r>
+              <a:rPr lang="de-AT" dirty="0">
+                <a:solidFill>
+                  <a:schemeClr val="bg1"/>
+                </a:solidFill>
+              </a:rPr>
+              <a:t> von </a:t>
+            </a:r>
+            <a:r>
+              <a:rPr lang="de-AT" dirty="0" err="1">
+                <a:solidFill>
+                  <a:schemeClr val="bg1"/>
+                </a:solidFill>
+              </a:rPr>
+              <a:t>erm</a:t>
+            </a:r>
+            <a:r>
+              <a:rPr lang="de-AT" dirty="0">
+                <a:solidFill>
+                  <a:schemeClr val="bg1"/>
+                </a:solidFill>
+              </a:rPr>
+              <a:t> </a:t>
+            </a:r>
+            <a:r>
+              <a:rPr lang="de-AT" dirty="0" err="1">
+                <a:solidFill>
+                  <a:schemeClr val="bg1"/>
+                </a:solidFill>
+              </a:rPr>
+              <a:t>drucka</a:t>
+            </a:r>
+            <a:endParaRPr lang="de-AT" dirty="0">
+              <a:solidFill>
+                <a:schemeClr val="bg1"/>
+              </a:solidFill>
+            </a:endParaRPr>
+          </a:p>
+          <a:p>
+            <a:pPr lvl="1"/>
+            <a:r>
+              <a:rPr lang="de-AT" dirty="0">
+                <a:solidFill>
+                  <a:schemeClr val="bg1"/>
+                </a:solidFill>
+              </a:rPr>
+              <a:t>Direkt auf sein </a:t>
+            </a:r>
+            <a:r>
+              <a:rPr lang="de-AT" dirty="0" err="1">
+                <a:solidFill>
+                  <a:schemeClr val="bg1"/>
+                </a:solidFill>
+              </a:rPr>
+              <a:t>facebook</a:t>
+            </a:r>
+            <a:r>
+              <a:rPr lang="de-AT" dirty="0">
+                <a:solidFill>
+                  <a:schemeClr val="bg1"/>
+                </a:solidFill>
+              </a:rPr>
+              <a:t> </a:t>
+            </a:r>
+            <a:r>
+              <a:rPr lang="de-AT" dirty="0" err="1">
+                <a:solidFill>
+                  <a:schemeClr val="bg1"/>
+                </a:solidFill>
+              </a:rPr>
+              <a:t>account</a:t>
+            </a:r>
+            <a:r>
+              <a:rPr lang="de-AT" dirty="0">
+                <a:solidFill>
+                  <a:schemeClr val="bg1"/>
+                </a:solidFill>
+              </a:rPr>
+              <a:t> </a:t>
+            </a:r>
+            <a:r>
+              <a:rPr lang="de-AT" dirty="0" err="1">
+                <a:solidFill>
+                  <a:schemeClr val="bg1"/>
+                </a:solidFill>
+              </a:rPr>
+              <a:t>kema</a:t>
+            </a:r>
+            <a:endParaRPr lang="de-AT" dirty="0">
+              <a:solidFill>
+                <a:schemeClr val="bg1"/>
+              </a:solidFill>
+            </a:endParaRPr>
+          </a:p>
+          <a:p>
+            <a:pPr lvl="1"/>
+            <a:r>
+              <a:rPr lang="de-AT" dirty="0">
+                <a:solidFill>
+                  <a:schemeClr val="bg1"/>
+                </a:solidFill>
+              </a:rPr>
+              <a:t>nice</a:t>
+            </a:r>
           </a:p>
         </p:txBody>
       </p:sp>
@@ -3777,7 +4789,7 @@
           <p:cNvPr id="2" name="Titel 1">
             <a:extLst>
               <a:ext uri="{FF2B5EF4-FFF2-40B4-BE49-F238E27FC236}">
-                <a16:creationId xmlns:a16="http://schemas.microsoft.com/office/drawing/2014/main" id="{0963D2CF-884A-48C4-8D1C-8A4C50BC611F}"/>
+                <a16:creationId xmlns:a16="http://schemas.microsoft.com/office/drawing/2014/main" id="{7634C6EE-E185-4627-B7E1-E903009D780C}"/>
               </a:ext>
             </a:extLst>
           </p:cNvPr>
@@ -3799,7 +4811,7 @@
                   <a:schemeClr val="bg1"/>
                 </a:solidFill>
               </a:rPr>
-              <a:t>Technischer</a:t>
+              <a:t>Attraktiver</a:t>
             </a:r>
             <a:r>
               <a:rPr lang="de-AT" dirty="0"/>
@@ -3811,7 +4823,7 @@
                   <a:schemeClr val="bg1"/>
                 </a:solidFill>
               </a:rPr>
-              <a:t>Hintergrund</a:t>
+              <a:t>Vordergrund</a:t>
             </a:r>
           </a:p>
         </p:txBody>
@@ -3821,7 +4833,7 @@
           <p:cNvPr id="3" name="Inhaltsplatzhalter 2">
             <a:extLst>
               <a:ext uri="{FF2B5EF4-FFF2-40B4-BE49-F238E27FC236}">
-                <a16:creationId xmlns:a16="http://schemas.microsoft.com/office/drawing/2014/main" id="{9B3D2C2A-05BD-4C50-893E-6B7E2A51763F}"/>
+                <a16:creationId xmlns:a16="http://schemas.microsoft.com/office/drawing/2014/main" id="{5B1E44E3-26C8-4AD3-8F04-8CF43EAD8893}"/>
               </a:ext>
             </a:extLst>
           </p:cNvPr>
@@ -3837,14 +4849,146 @@
           <a:bodyPr/>
           <a:lstStyle/>
           <a:p>
-            <a:endParaRPr lang="de-AT"/>
+            <a:r>
+              <a:rPr lang="de-AT" dirty="0">
+                <a:solidFill>
+                  <a:schemeClr val="bg1"/>
+                </a:solidFill>
+              </a:rPr>
+              <a:t>HTML / CSS </a:t>
+            </a:r>
+            <a:r>
+              <a:rPr lang="de-AT" dirty="0" err="1">
+                <a:solidFill>
+                  <a:schemeClr val="bg1"/>
+                </a:solidFill>
+              </a:rPr>
+              <a:t>frontend</a:t>
+            </a:r>
+            <a:endParaRPr lang="de-AT" dirty="0">
+              <a:solidFill>
+                <a:schemeClr val="bg1"/>
+              </a:solidFill>
+            </a:endParaRPr>
+          </a:p>
+          <a:p>
+            <a:r>
+              <a:rPr lang="de-AT" dirty="0">
+                <a:solidFill>
+                  <a:schemeClr val="bg1"/>
+                </a:solidFill>
+              </a:rPr>
+              <a:t>Material design </a:t>
+            </a:r>
+            <a:r>
+              <a:rPr lang="de-AT" dirty="0" err="1">
+                <a:solidFill>
+                  <a:schemeClr val="bg1"/>
+                </a:solidFill>
+              </a:rPr>
+              <a:t>lite</a:t>
+            </a:r>
+            <a:r>
+              <a:rPr lang="de-AT" dirty="0">
+                <a:solidFill>
+                  <a:schemeClr val="bg1"/>
+                </a:solidFill>
+              </a:rPr>
+              <a:t> von </a:t>
+            </a:r>
+            <a:r>
+              <a:rPr lang="de-AT" dirty="0" err="1">
+                <a:solidFill>
+                  <a:schemeClr val="bg1"/>
+                </a:solidFill>
+              </a:rPr>
+              <a:t>google</a:t>
+            </a:r>
+            <a:r>
+              <a:rPr lang="de-AT" dirty="0">
+                <a:solidFill>
+                  <a:schemeClr val="bg1"/>
+                </a:solidFill>
+              </a:rPr>
+              <a:t> material design</a:t>
+            </a:r>
+          </a:p>
+          <a:p>
+            <a:r>
+              <a:rPr lang="de-AT" dirty="0" err="1">
+                <a:solidFill>
+                  <a:schemeClr val="bg1"/>
+                </a:solidFill>
+              </a:rPr>
+              <a:t>Javascript</a:t>
+            </a:r>
+            <a:r>
+              <a:rPr lang="de-AT" dirty="0">
+                <a:solidFill>
+                  <a:schemeClr val="bg1"/>
+                </a:solidFill>
+              </a:rPr>
+              <a:t> </a:t>
+            </a:r>
+            <a:r>
+              <a:rPr lang="de-AT" dirty="0" err="1">
+                <a:solidFill>
+                  <a:schemeClr val="bg1"/>
+                </a:solidFill>
+              </a:rPr>
+              <a:t>managed</a:t>
+            </a:r>
+            <a:r>
+              <a:rPr lang="de-AT" dirty="0">
+                <a:solidFill>
+                  <a:schemeClr val="bg1"/>
+                </a:solidFill>
+              </a:rPr>
+              <a:t> uns de </a:t>
+            </a:r>
+            <a:r>
+              <a:rPr lang="de-AT" dirty="0" err="1">
+                <a:solidFill>
+                  <a:schemeClr val="bg1"/>
+                </a:solidFill>
+              </a:rPr>
+              <a:t>frontend</a:t>
+            </a:r>
+            <a:r>
+              <a:rPr lang="de-AT" dirty="0">
+                <a:solidFill>
+                  <a:schemeClr val="bg1"/>
+                </a:solidFill>
+              </a:rPr>
+              <a:t> </a:t>
+            </a:r>
+            <a:r>
+              <a:rPr lang="de-AT" dirty="0" err="1">
+                <a:solidFill>
+                  <a:schemeClr val="bg1"/>
+                </a:solidFill>
+              </a:rPr>
+              <a:t>events</a:t>
+            </a:r>
+            <a:endParaRPr lang="de-AT" dirty="0">
+              <a:solidFill>
+                <a:schemeClr val="bg1"/>
+              </a:solidFill>
+            </a:endParaRPr>
+          </a:p>
+          <a:p>
+            <a:endParaRPr lang="de-AT" dirty="0">
+              <a:solidFill>
+                <a:schemeClr val="bg1"/>
+              </a:solidFill>
+            </a:endParaRPr>
           </a:p>
         </p:txBody>
       </p:sp>
     </p:spTree>
     <p:extLst>
       <p:ext uri="{BB962C8B-B14F-4D97-AF65-F5344CB8AC3E}">
-        <p14:creationId xmlns:p14="http://schemas.microsoft.com/office/powerpoint/2010/main" val="3325072263"/>
+        <p14:creationId xmlns:p14="http://schemas.microsoft.com/office/powerpoint/2010/main" val="2435851027"/>
       </p:ext>
     </p:extLst>
   </p:cSld>
@@ -3876,7 +5020,7 @@
           <p:cNvPr id="2" name="Titel 1">
             <a:extLst>
               <a:ext uri="{FF2B5EF4-FFF2-40B4-BE49-F238E27FC236}">
-                <a16:creationId xmlns:a16="http://schemas.microsoft.com/office/drawing/2014/main" id="{7634C6EE-E185-4627-B7E1-E903009D780C}"/>
+                <a16:creationId xmlns:a16="http://schemas.microsoft.com/office/drawing/2014/main" id="{0963D2CF-884A-48C4-8D1C-8A4C50BC611F}"/>
               </a:ext>
             </a:extLst>
           </p:cNvPr>
@@ -3898,7 +5042,7 @@
                   <a:schemeClr val="bg1"/>
                 </a:solidFill>
               </a:rPr>
-              <a:t>Attraktiver</a:t>
+              <a:t>Technischer</a:t>
             </a:r>
             <a:r>
               <a:rPr lang="de-AT" dirty="0"/>
@@ -3910,7 +5054,7 @@
                   <a:schemeClr val="bg1"/>
                 </a:solidFill>
               </a:rPr>
-              <a:t>Vordergrund</a:t>
+              <a:t>Hintergrund</a:t>
             </a:r>
           </a:p>
         </p:txBody>
@@ -3920,7 +5064,7 @@
           <p:cNvPr id="3" name="Inhaltsplatzhalter 2">
             <a:extLst>
               <a:ext uri="{FF2B5EF4-FFF2-40B4-BE49-F238E27FC236}">
-                <a16:creationId xmlns:a16="http://schemas.microsoft.com/office/drawing/2014/main" id="{5B1E44E3-26C8-4AD3-8F04-8CF43EAD8893}"/>
+                <a16:creationId xmlns:a16="http://schemas.microsoft.com/office/drawing/2014/main" id="{9B3D2C2A-05BD-4C50-893E-6B7E2A51763F}"/>
               </a:ext>
             </a:extLst>
           </p:cNvPr>
@@ -3936,14 +5080,317 @@
           <a:bodyPr/>
           <a:lstStyle/>
           <a:p>
-            <a:endParaRPr lang="de-AT"/>
+            <a:r>
+              <a:rPr lang="de-AT" dirty="0">
+                <a:solidFill>
+                  <a:schemeClr val="bg1"/>
+                </a:solidFill>
+              </a:rPr>
+              <a:t>Die </a:t>
+            </a:r>
+            <a:r>
+              <a:rPr lang="de-AT" dirty="0" err="1">
+                <a:solidFill>
+                  <a:schemeClr val="bg1"/>
+                </a:solidFill>
+              </a:rPr>
+              <a:t>events</a:t>
+            </a:r>
+            <a:r>
+              <a:rPr lang="de-AT" dirty="0">
+                <a:solidFill>
+                  <a:schemeClr val="bg1"/>
+                </a:solidFill>
+              </a:rPr>
+              <a:t> </a:t>
+            </a:r>
+            <a:r>
+              <a:rPr lang="de-AT" dirty="0" err="1">
+                <a:solidFill>
+                  <a:schemeClr val="bg1"/>
+                </a:solidFill>
+              </a:rPr>
+              <a:t>ruaffn</a:t>
+            </a:r>
+            <a:r>
+              <a:rPr lang="de-AT" dirty="0">
+                <a:solidFill>
+                  <a:schemeClr val="bg1"/>
+                </a:solidFill>
+              </a:rPr>
+              <a:t> </a:t>
+            </a:r>
+            <a:r>
+              <a:rPr lang="de-AT" dirty="0" err="1">
+                <a:solidFill>
+                  <a:schemeClr val="bg1"/>
+                </a:solidFill>
+              </a:rPr>
+              <a:t>daun</a:t>
+            </a:r>
+            <a:r>
+              <a:rPr lang="de-AT" dirty="0">
+                <a:solidFill>
+                  <a:schemeClr val="bg1"/>
+                </a:solidFill>
+              </a:rPr>
+              <a:t> an </a:t>
+            </a:r>
+            <a:r>
+              <a:rPr lang="de-AT" dirty="0" err="1">
+                <a:solidFill>
+                  <a:schemeClr val="bg1"/>
+                </a:solidFill>
+              </a:rPr>
+              <a:t>ajax</a:t>
+            </a:r>
+            <a:r>
+              <a:rPr lang="de-AT" dirty="0">
+                <a:solidFill>
+                  <a:schemeClr val="bg1"/>
+                </a:solidFill>
+              </a:rPr>
+              <a:t> </a:t>
+            </a:r>
+            <a:r>
+              <a:rPr lang="de-AT" dirty="0" err="1">
+                <a:solidFill>
+                  <a:schemeClr val="bg1"/>
+                </a:solidFill>
+              </a:rPr>
+              <a:t>call</a:t>
+            </a:r>
+            <a:r>
+              <a:rPr lang="de-AT" dirty="0">
+                <a:solidFill>
+                  <a:schemeClr val="bg1"/>
+                </a:solidFill>
+              </a:rPr>
+              <a:t> auf</a:t>
+            </a:r>
+          </a:p>
+          <a:p>
+            <a:r>
+              <a:rPr lang="de-AT" dirty="0">
+                <a:solidFill>
+                  <a:schemeClr val="bg1"/>
+                </a:solidFill>
+              </a:rPr>
+              <a:t>Der </a:t>
+            </a:r>
+            <a:r>
+              <a:rPr lang="de-AT" dirty="0" err="1">
+                <a:solidFill>
+                  <a:schemeClr val="bg1"/>
+                </a:solidFill>
+              </a:rPr>
+              <a:t>ajax</a:t>
+            </a:r>
+            <a:r>
+              <a:rPr lang="de-AT" dirty="0">
+                <a:solidFill>
+                  <a:schemeClr val="bg1"/>
+                </a:solidFill>
+              </a:rPr>
+              <a:t> geht aufs </a:t>
+            </a:r>
+            <a:r>
+              <a:rPr lang="de-AT" dirty="0" err="1">
+                <a:solidFill>
+                  <a:schemeClr val="bg1"/>
+                </a:solidFill>
+              </a:rPr>
+              <a:t>php</a:t>
+            </a:r>
+            <a:r>
+              <a:rPr lang="de-AT" dirty="0">
+                <a:solidFill>
+                  <a:schemeClr val="bg1"/>
+                </a:solidFill>
+              </a:rPr>
+              <a:t> </a:t>
+            </a:r>
+            <a:r>
+              <a:rPr lang="de-AT" dirty="0" err="1">
+                <a:solidFill>
+                  <a:schemeClr val="bg1"/>
+                </a:solidFill>
+              </a:rPr>
+              <a:t>service</a:t>
+            </a:r>
+            <a:r>
+              <a:rPr lang="de-AT" dirty="0">
+                <a:solidFill>
+                  <a:schemeClr val="bg1"/>
+                </a:solidFill>
+              </a:rPr>
+              <a:t> und liefert </a:t>
+            </a:r>
+            <a:r>
+              <a:rPr lang="de-AT" dirty="0" err="1">
+                <a:solidFill>
+                  <a:schemeClr val="bg1"/>
+                </a:solidFill>
+              </a:rPr>
+              <a:t>json</a:t>
+            </a:r>
+            <a:r>
+              <a:rPr lang="de-AT" dirty="0">
+                <a:solidFill>
+                  <a:schemeClr val="bg1"/>
+                </a:solidFill>
+              </a:rPr>
+              <a:t> daten </a:t>
+            </a:r>
+            <a:r>
+              <a:rPr lang="de-AT" dirty="0" err="1">
+                <a:solidFill>
+                  <a:schemeClr val="bg1"/>
+                </a:solidFill>
+              </a:rPr>
+              <a:t>ois</a:t>
+            </a:r>
+            <a:r>
+              <a:rPr lang="de-AT" dirty="0">
+                <a:solidFill>
+                  <a:schemeClr val="bg1"/>
+                </a:solidFill>
+              </a:rPr>
+              <a:t> </a:t>
+            </a:r>
+            <a:r>
+              <a:rPr lang="de-AT" dirty="0" err="1">
+                <a:solidFill>
+                  <a:schemeClr val="bg1"/>
+                </a:solidFill>
+              </a:rPr>
+              <a:t>ergebnis</a:t>
+            </a:r>
+            <a:endParaRPr lang="de-AT" dirty="0">
+              <a:solidFill>
+                <a:schemeClr val="bg1"/>
+              </a:solidFill>
+            </a:endParaRPr>
+          </a:p>
+          <a:p>
+            <a:r>
+              <a:rPr lang="de-AT" dirty="0">
+                <a:solidFill>
+                  <a:schemeClr val="bg1"/>
+                </a:solidFill>
+              </a:rPr>
+              <a:t>De </a:t>
+            </a:r>
+            <a:r>
+              <a:rPr lang="de-AT" dirty="0" err="1">
+                <a:solidFill>
+                  <a:schemeClr val="bg1"/>
+                </a:solidFill>
+              </a:rPr>
+              <a:t>json</a:t>
+            </a:r>
+            <a:r>
+              <a:rPr lang="de-AT" dirty="0">
+                <a:solidFill>
+                  <a:schemeClr val="bg1"/>
+                </a:solidFill>
+              </a:rPr>
+              <a:t> daten werden durch </a:t>
+            </a:r>
+            <a:r>
+              <a:rPr lang="de-AT" dirty="0" err="1">
+                <a:solidFill>
+                  <a:schemeClr val="bg1"/>
+                </a:solidFill>
+              </a:rPr>
+              <a:t>js</a:t>
+            </a:r>
+            <a:r>
+              <a:rPr lang="de-AT" dirty="0">
+                <a:solidFill>
+                  <a:schemeClr val="bg1"/>
+                </a:solidFill>
+              </a:rPr>
+              <a:t> dynamisch zu </a:t>
+            </a:r>
+            <a:r>
+              <a:rPr lang="de-AT" dirty="0" err="1">
+                <a:solidFill>
+                  <a:schemeClr val="bg1"/>
+                </a:solidFill>
+              </a:rPr>
+              <a:t>html</a:t>
+            </a:r>
+            <a:r>
+              <a:rPr lang="de-AT" dirty="0">
+                <a:solidFill>
+                  <a:schemeClr val="bg1"/>
+                </a:solidFill>
+              </a:rPr>
+              <a:t> generiert</a:t>
+            </a:r>
+          </a:p>
+          <a:p>
+            <a:r>
+              <a:rPr lang="de-AT" dirty="0">
+                <a:solidFill>
+                  <a:schemeClr val="bg1"/>
+                </a:solidFill>
+              </a:rPr>
+              <a:t>Und </a:t>
+            </a:r>
+            <a:r>
+              <a:rPr lang="de-AT" dirty="0" err="1">
+                <a:solidFill>
+                  <a:schemeClr val="bg1"/>
+                </a:solidFill>
+              </a:rPr>
+              <a:t>auzagt</a:t>
+            </a:r>
+            <a:r>
+              <a:rPr lang="de-AT" dirty="0">
+                <a:solidFill>
+                  <a:schemeClr val="bg1"/>
+                </a:solidFill>
+              </a:rPr>
+              <a:t> am </a:t>
+            </a:r>
+            <a:r>
+              <a:rPr lang="de-AT" dirty="0" err="1">
+                <a:solidFill>
+                  <a:schemeClr val="bg1"/>
+                </a:solidFill>
+              </a:rPr>
+              <a:t>html</a:t>
+            </a:r>
+            <a:r>
+              <a:rPr lang="de-AT" dirty="0">
+                <a:solidFill>
+                  <a:schemeClr val="bg1"/>
+                </a:solidFill>
+              </a:rPr>
+              <a:t> </a:t>
+            </a:r>
+            <a:r>
+              <a:rPr lang="de-AT" dirty="0" err="1">
+                <a:solidFill>
+                  <a:schemeClr val="bg1"/>
+                </a:solidFill>
+              </a:rPr>
+              <a:t>frontend</a:t>
+            </a:r>
+            <a:endParaRPr lang="de-AT" dirty="0">
+              <a:solidFill>
+                <a:schemeClr val="bg1"/>
+              </a:solidFill>
+            </a:endParaRPr>
           </a:p>
         </p:txBody>
       </p:sp>
     </p:spTree>
     <p:extLst>
       <p:ext uri="{BB962C8B-B14F-4D97-AF65-F5344CB8AC3E}">
-        <p14:creationId xmlns:p14="http://schemas.microsoft.com/office/powerpoint/2010/main" val="2435851027"/>
+        <p14:creationId xmlns:p14="http://schemas.microsoft.com/office/powerpoint/2010/main" val="3325072263"/>
       </p:ext>
     </p:extLst>
   </p:cSld>
@@ -4025,7 +5472,531 @@
           <a:bodyPr/>
           <a:lstStyle/>
           <a:p>
-            <a:endParaRPr lang="de-AT"/>
+            <a:r>
+              <a:rPr lang="de-AT" dirty="0">
+                <a:solidFill>
+                  <a:schemeClr val="bg1"/>
+                </a:solidFill>
+              </a:rPr>
+              <a:t>Stoff, den </a:t>
+            </a:r>
+            <a:r>
+              <a:rPr lang="de-AT" dirty="0" err="1">
+                <a:solidFill>
+                  <a:schemeClr val="bg1"/>
+                </a:solidFill>
+              </a:rPr>
+              <a:t>ma</a:t>
+            </a:r>
+            <a:r>
+              <a:rPr lang="de-AT" dirty="0">
+                <a:solidFill>
+                  <a:schemeClr val="bg1"/>
+                </a:solidFill>
+              </a:rPr>
+              <a:t> so nu </a:t>
+            </a:r>
+            <a:r>
+              <a:rPr lang="de-AT" dirty="0" err="1">
+                <a:solidFill>
+                  <a:schemeClr val="bg1"/>
+                </a:solidFill>
+              </a:rPr>
+              <a:t>ned</a:t>
+            </a:r>
+            <a:r>
+              <a:rPr lang="de-AT" dirty="0">
+                <a:solidFill>
+                  <a:schemeClr val="bg1"/>
+                </a:solidFill>
+              </a:rPr>
+              <a:t> </a:t>
+            </a:r>
+            <a:r>
+              <a:rPr lang="de-AT" dirty="0" err="1">
+                <a:solidFill>
+                  <a:schemeClr val="bg1"/>
+                </a:solidFill>
+              </a:rPr>
+              <a:t>gmocht</a:t>
+            </a:r>
+            <a:r>
+              <a:rPr lang="de-AT" dirty="0">
+                <a:solidFill>
+                  <a:schemeClr val="bg1"/>
+                </a:solidFill>
+              </a:rPr>
+              <a:t> </a:t>
+            </a:r>
+            <a:r>
+              <a:rPr lang="de-AT" dirty="0" err="1">
+                <a:solidFill>
+                  <a:schemeClr val="bg1"/>
+                </a:solidFill>
+              </a:rPr>
+              <a:t>haum</a:t>
+            </a:r>
+            <a:endParaRPr lang="de-AT" dirty="0">
+              <a:solidFill>
+                <a:schemeClr val="bg1"/>
+              </a:solidFill>
+            </a:endParaRPr>
+          </a:p>
+          <a:p>
+            <a:r>
+              <a:rPr lang="de-AT" dirty="0">
+                <a:solidFill>
+                  <a:schemeClr val="bg1"/>
+                </a:solidFill>
+              </a:rPr>
+              <a:t>Jeder </a:t>
+            </a:r>
+            <a:r>
+              <a:rPr lang="de-AT" dirty="0" err="1">
+                <a:solidFill>
+                  <a:schemeClr val="bg1"/>
+                </a:solidFill>
+              </a:rPr>
+              <a:t>hod</a:t>
+            </a:r>
+            <a:r>
+              <a:rPr lang="de-AT" dirty="0">
+                <a:solidFill>
+                  <a:schemeClr val="bg1"/>
+                </a:solidFill>
+              </a:rPr>
+              <a:t> si </a:t>
+            </a:r>
+            <a:r>
+              <a:rPr lang="de-AT" dirty="0" err="1">
+                <a:solidFill>
+                  <a:schemeClr val="bg1"/>
+                </a:solidFill>
+              </a:rPr>
+              <a:t>ajax</a:t>
+            </a:r>
+            <a:r>
+              <a:rPr lang="de-AT" dirty="0">
+                <a:solidFill>
+                  <a:schemeClr val="bg1"/>
+                </a:solidFill>
+              </a:rPr>
+              <a:t>, </a:t>
+            </a:r>
+            <a:r>
+              <a:rPr lang="de-AT" dirty="0" err="1">
+                <a:solidFill>
+                  <a:schemeClr val="bg1"/>
+                </a:solidFill>
+              </a:rPr>
+              <a:t>details</a:t>
+            </a:r>
+            <a:r>
+              <a:rPr lang="de-AT" dirty="0">
+                <a:solidFill>
+                  <a:schemeClr val="bg1"/>
+                </a:solidFill>
+              </a:rPr>
+              <a:t> in </a:t>
+            </a:r>
+            <a:r>
+              <a:rPr lang="de-AT" dirty="0" err="1">
+                <a:solidFill>
+                  <a:schemeClr val="bg1"/>
+                </a:solidFill>
+              </a:rPr>
+              <a:t>javascript</a:t>
+            </a:r>
+            <a:r>
+              <a:rPr lang="de-AT" dirty="0">
+                <a:solidFill>
+                  <a:schemeClr val="bg1"/>
+                </a:solidFill>
+              </a:rPr>
+              <a:t> </a:t>
+            </a:r>
+            <a:r>
+              <a:rPr lang="de-AT" dirty="0" err="1">
+                <a:solidFill>
+                  <a:schemeClr val="bg1"/>
+                </a:solidFill>
+              </a:rPr>
+              <a:t>auschaun</a:t>
+            </a:r>
+            <a:r>
+              <a:rPr lang="de-AT" dirty="0">
+                <a:solidFill>
+                  <a:schemeClr val="bg1"/>
+                </a:solidFill>
+              </a:rPr>
+              <a:t> </a:t>
+            </a:r>
+            <a:r>
+              <a:rPr lang="de-AT" dirty="0" err="1">
+                <a:solidFill>
+                  <a:schemeClr val="bg1"/>
+                </a:solidFill>
+              </a:rPr>
+              <a:t>miassn</a:t>
+            </a:r>
+            <a:endParaRPr lang="de-AT" dirty="0">
+              <a:solidFill>
+                <a:schemeClr val="bg1"/>
+              </a:solidFill>
+            </a:endParaRPr>
+          </a:p>
+          <a:p>
+            <a:r>
+              <a:rPr lang="de-AT" dirty="0">
+                <a:solidFill>
+                  <a:schemeClr val="bg1"/>
+                </a:solidFill>
+              </a:rPr>
+              <a:t>Stefan </a:t>
+            </a:r>
+            <a:r>
+              <a:rPr lang="de-AT" dirty="0" err="1">
+                <a:solidFill>
+                  <a:schemeClr val="bg1"/>
+                </a:solidFill>
+              </a:rPr>
+              <a:t>hod</a:t>
+            </a:r>
+            <a:r>
+              <a:rPr lang="de-AT" dirty="0">
+                <a:solidFill>
+                  <a:schemeClr val="bg1"/>
+                </a:solidFill>
+              </a:rPr>
+              <a:t> si a komplette design </a:t>
+            </a:r>
+            <a:r>
+              <a:rPr lang="de-AT" dirty="0" err="1">
+                <a:solidFill>
+                  <a:schemeClr val="bg1"/>
+                </a:solidFill>
+              </a:rPr>
+              <a:t>library</a:t>
+            </a:r>
+            <a:r>
+              <a:rPr lang="de-AT" dirty="0">
+                <a:solidFill>
+                  <a:schemeClr val="bg1"/>
+                </a:solidFill>
+              </a:rPr>
+              <a:t> </a:t>
+            </a:r>
+            <a:r>
+              <a:rPr lang="de-AT" dirty="0" err="1">
+                <a:solidFill>
+                  <a:schemeClr val="bg1"/>
+                </a:solidFill>
+              </a:rPr>
+              <a:t>lerna</a:t>
+            </a:r>
+            <a:r>
+              <a:rPr lang="de-AT" dirty="0">
+                <a:solidFill>
+                  <a:schemeClr val="bg1"/>
+                </a:solidFill>
+              </a:rPr>
+              <a:t> </a:t>
+            </a:r>
+            <a:r>
+              <a:rPr lang="de-AT" dirty="0" err="1">
+                <a:solidFill>
+                  <a:schemeClr val="bg1"/>
+                </a:solidFill>
+              </a:rPr>
+              <a:t>miassn</a:t>
+            </a:r>
+            <a:endParaRPr lang="de-AT" dirty="0">
+              <a:solidFill>
+                <a:schemeClr val="bg1"/>
+              </a:solidFill>
+            </a:endParaRPr>
+          </a:p>
+          <a:p>
+            <a:r>
+              <a:rPr lang="de-AT" dirty="0" err="1">
+                <a:solidFill>
+                  <a:schemeClr val="bg1"/>
+                </a:solidFill>
+              </a:rPr>
+              <a:t>Db</a:t>
+            </a:r>
+            <a:r>
+              <a:rPr lang="de-AT" dirty="0">
+                <a:solidFill>
+                  <a:schemeClr val="bg1"/>
+                </a:solidFill>
+              </a:rPr>
+              <a:t> </a:t>
+            </a:r>
+            <a:r>
+              <a:rPr lang="de-AT" dirty="0" err="1">
+                <a:solidFill>
+                  <a:schemeClr val="bg1"/>
+                </a:solidFill>
+              </a:rPr>
+              <a:t>is</a:t>
+            </a:r>
+            <a:r>
+              <a:rPr lang="de-AT" dirty="0">
+                <a:solidFill>
+                  <a:schemeClr val="bg1"/>
+                </a:solidFill>
+              </a:rPr>
+              <a:t> schau </a:t>
+            </a:r>
+            <a:r>
+              <a:rPr lang="de-AT" dirty="0" err="1">
+                <a:solidFill>
+                  <a:schemeClr val="bg1"/>
+                </a:solidFill>
+              </a:rPr>
+              <a:t>gstaundn</a:t>
+            </a:r>
+            <a:r>
+              <a:rPr lang="de-AT" dirty="0">
+                <a:solidFill>
+                  <a:schemeClr val="bg1"/>
+                </a:solidFill>
+              </a:rPr>
+              <a:t>, bevor </a:t>
+            </a:r>
+            <a:r>
+              <a:rPr lang="de-AT" dirty="0" err="1">
+                <a:solidFill>
+                  <a:schemeClr val="bg1"/>
+                </a:solidFill>
+              </a:rPr>
+              <a:t>ma</a:t>
+            </a:r>
+            <a:r>
+              <a:rPr lang="de-AT" dirty="0">
+                <a:solidFill>
+                  <a:schemeClr val="bg1"/>
+                </a:solidFill>
+              </a:rPr>
+              <a:t> in da ersten </a:t>
+            </a:r>
+            <a:r>
+              <a:rPr lang="de-AT" dirty="0" err="1">
+                <a:solidFill>
+                  <a:schemeClr val="bg1"/>
+                </a:solidFill>
+              </a:rPr>
+              <a:t>übung</a:t>
+            </a:r>
+            <a:r>
+              <a:rPr lang="de-AT" dirty="0">
+                <a:solidFill>
+                  <a:schemeClr val="bg1"/>
+                </a:solidFill>
+              </a:rPr>
+              <a:t> </a:t>
+            </a:r>
+            <a:r>
+              <a:rPr lang="de-AT" dirty="0" err="1">
+                <a:solidFill>
+                  <a:schemeClr val="bg1"/>
+                </a:solidFill>
+              </a:rPr>
+              <a:t>dab</a:t>
+            </a:r>
+            <a:r>
+              <a:rPr lang="de-AT" dirty="0">
+                <a:solidFill>
+                  <a:schemeClr val="bg1"/>
+                </a:solidFill>
+              </a:rPr>
+              <a:t> </a:t>
+            </a:r>
+            <a:r>
+              <a:rPr lang="de-AT" dirty="0" err="1">
+                <a:solidFill>
+                  <a:schemeClr val="bg1"/>
+                </a:solidFill>
+              </a:rPr>
+              <a:t>woan</a:t>
+            </a:r>
+            <a:endParaRPr lang="de-AT" dirty="0">
+              <a:solidFill>
+                <a:schemeClr val="bg1"/>
+              </a:solidFill>
+            </a:endParaRPr>
+          </a:p>
+          <a:p>
+            <a:r>
+              <a:rPr lang="de-AT" dirty="0">
+                <a:solidFill>
+                  <a:schemeClr val="bg1"/>
+                </a:solidFill>
+              </a:rPr>
+              <a:t>Unser erstes </a:t>
+            </a:r>
+            <a:r>
+              <a:rPr lang="de-AT" dirty="0" err="1">
+                <a:solidFill>
+                  <a:schemeClr val="bg1"/>
+                </a:solidFill>
+              </a:rPr>
+              <a:t>login</a:t>
+            </a:r>
+            <a:r>
+              <a:rPr lang="de-AT" dirty="0">
+                <a:solidFill>
+                  <a:schemeClr val="bg1"/>
+                </a:solidFill>
+              </a:rPr>
+              <a:t> </a:t>
+            </a:r>
+            <a:r>
+              <a:rPr lang="de-AT" dirty="0" err="1">
+                <a:solidFill>
+                  <a:schemeClr val="bg1"/>
+                </a:solidFill>
+              </a:rPr>
+              <a:t>fenster</a:t>
+            </a:r>
+            <a:r>
+              <a:rPr lang="de-AT" dirty="0">
+                <a:solidFill>
+                  <a:schemeClr val="bg1"/>
+                </a:solidFill>
+              </a:rPr>
+              <a:t> </a:t>
+            </a:r>
+            <a:r>
+              <a:rPr lang="de-AT" dirty="0" err="1">
+                <a:solidFill>
+                  <a:schemeClr val="bg1"/>
+                </a:solidFill>
+              </a:rPr>
+              <a:t>woa</a:t>
+            </a:r>
+            <a:r>
+              <a:rPr lang="de-AT" dirty="0">
+                <a:solidFill>
+                  <a:schemeClr val="bg1"/>
+                </a:solidFill>
+              </a:rPr>
+              <a:t> </a:t>
+            </a:r>
+            <a:r>
+              <a:rPr lang="de-AT" dirty="0" err="1">
+                <a:solidFill>
+                  <a:schemeClr val="bg1"/>
+                </a:solidFill>
+              </a:rPr>
+              <a:t>shizzle</a:t>
+            </a:r>
+            <a:endParaRPr lang="de-AT" dirty="0">
+              <a:solidFill>
+                <a:schemeClr val="bg1"/>
+              </a:solidFill>
+            </a:endParaRPr>
+          </a:p>
+          <a:p>
+            <a:r>
+              <a:rPr lang="de-AT" dirty="0">
+                <a:solidFill>
+                  <a:schemeClr val="bg1"/>
+                </a:solidFill>
+              </a:rPr>
+              <a:t>Shift f5</a:t>
+            </a:r>
+          </a:p>
+          <a:p>
+            <a:r>
+              <a:rPr lang="de-AT" dirty="0">
+                <a:solidFill>
+                  <a:schemeClr val="bg1"/>
+                </a:solidFill>
+              </a:rPr>
+              <a:t>Material design </a:t>
+            </a:r>
+            <a:r>
+              <a:rPr lang="de-AT" dirty="0" err="1">
+                <a:solidFill>
+                  <a:schemeClr val="bg1"/>
+                </a:solidFill>
+              </a:rPr>
+              <a:t>sochn</a:t>
+            </a:r>
+            <a:r>
+              <a:rPr lang="de-AT" dirty="0">
+                <a:solidFill>
+                  <a:schemeClr val="bg1"/>
+                </a:solidFill>
+              </a:rPr>
+              <a:t> </a:t>
+            </a:r>
+            <a:r>
+              <a:rPr lang="de-AT" dirty="0" err="1">
+                <a:solidFill>
+                  <a:schemeClr val="bg1"/>
+                </a:solidFill>
+              </a:rPr>
+              <a:t>adden</a:t>
+            </a:r>
+            <a:r>
+              <a:rPr lang="de-AT" dirty="0">
+                <a:solidFill>
+                  <a:schemeClr val="bg1"/>
+                </a:solidFill>
+              </a:rPr>
+              <a:t>, des so nu nirgends recht gibt und de </a:t>
+            </a:r>
+            <a:r>
+              <a:rPr lang="de-AT" dirty="0" err="1">
+                <a:solidFill>
+                  <a:schemeClr val="bg1"/>
+                </a:solidFill>
+              </a:rPr>
+              <a:t>schaun</a:t>
+            </a:r>
+            <a:r>
+              <a:rPr lang="de-AT" dirty="0">
+                <a:solidFill>
+                  <a:schemeClr val="bg1"/>
+                </a:solidFill>
+              </a:rPr>
+              <a:t> </a:t>
+            </a:r>
+            <a:r>
+              <a:rPr lang="de-AT" dirty="0" err="1">
+                <a:solidFill>
+                  <a:schemeClr val="bg1"/>
+                </a:solidFill>
+              </a:rPr>
+              <a:t>ned</a:t>
+            </a:r>
+            <a:r>
+              <a:rPr lang="de-AT" dirty="0">
+                <a:solidFill>
+                  <a:schemeClr val="bg1"/>
+                </a:solidFill>
+              </a:rPr>
+              <a:t> </a:t>
+            </a:r>
+            <a:r>
+              <a:rPr lang="de-AT" dirty="0" err="1">
+                <a:solidFill>
+                  <a:schemeClr val="bg1"/>
+                </a:solidFill>
+              </a:rPr>
+              <a:t>scheisse</a:t>
+            </a:r>
+            <a:r>
+              <a:rPr lang="de-AT" dirty="0">
+                <a:solidFill>
+                  <a:schemeClr val="bg1"/>
+                </a:solidFill>
+              </a:rPr>
+              <a:t> aus</a:t>
+            </a:r>
           </a:p>
         </p:txBody>
       </p:sp>
@@ -4114,7 +6085,131 @@
           <a:bodyPr/>
           <a:lstStyle/>
           <a:p>
-            <a:endParaRPr lang="de-AT"/>
+            <a:r>
+              <a:rPr lang="de-AT" dirty="0">
+                <a:solidFill>
+                  <a:schemeClr val="bg1"/>
+                </a:solidFill>
+              </a:rPr>
+              <a:t>APIs einbinden -&gt; Nur mehr auf </a:t>
+            </a:r>
+            <a:r>
+              <a:rPr lang="de-AT" dirty="0" err="1">
+                <a:solidFill>
+                  <a:schemeClr val="bg1"/>
+                </a:solidFill>
+              </a:rPr>
+              <a:t>add</a:t>
+            </a:r>
+            <a:r>
+              <a:rPr lang="de-AT" dirty="0">
+                <a:solidFill>
+                  <a:schemeClr val="bg1"/>
+                </a:solidFill>
+              </a:rPr>
+              <a:t> </a:t>
+            </a:r>
+            <a:r>
+              <a:rPr lang="de-AT" dirty="0" err="1">
+                <a:solidFill>
+                  <a:schemeClr val="bg1"/>
+                </a:solidFill>
+              </a:rPr>
+              <a:t>facebook</a:t>
+            </a:r>
+            <a:r>
+              <a:rPr lang="de-AT" dirty="0">
+                <a:solidFill>
+                  <a:schemeClr val="bg1"/>
+                </a:solidFill>
+              </a:rPr>
+              <a:t> </a:t>
+            </a:r>
+            <a:r>
+              <a:rPr lang="de-AT" dirty="0" err="1">
+                <a:solidFill>
+                  <a:schemeClr val="bg1"/>
+                </a:solidFill>
+              </a:rPr>
+              <a:t>druckn</a:t>
+            </a:r>
+            <a:r>
+              <a:rPr lang="de-AT" dirty="0">
+                <a:solidFill>
+                  <a:schemeClr val="bg1"/>
+                </a:solidFill>
+              </a:rPr>
+              <a:t>, und </a:t>
+            </a:r>
+            <a:r>
+              <a:rPr lang="de-AT" dirty="0" err="1">
+                <a:solidFill>
+                  <a:schemeClr val="bg1"/>
+                </a:solidFill>
+              </a:rPr>
+              <a:t>ma</a:t>
+            </a:r>
+            <a:r>
+              <a:rPr lang="de-AT" dirty="0">
+                <a:solidFill>
+                  <a:schemeClr val="bg1"/>
+                </a:solidFill>
+              </a:rPr>
+              <a:t> </a:t>
+            </a:r>
+            <a:r>
+              <a:rPr lang="de-AT" dirty="0" err="1">
+                <a:solidFill>
+                  <a:schemeClr val="bg1"/>
+                </a:solidFill>
+              </a:rPr>
+              <a:t>is</a:t>
+            </a:r>
+            <a:r>
+              <a:rPr lang="de-AT" dirty="0">
+                <a:solidFill>
+                  <a:schemeClr val="bg1"/>
+                </a:solidFill>
+              </a:rPr>
+              <a:t> instant verlinkt</a:t>
+            </a:r>
+          </a:p>
+          <a:p>
+            <a:r>
+              <a:rPr lang="de-AT" dirty="0">
+                <a:solidFill>
+                  <a:schemeClr val="bg1"/>
+                </a:solidFill>
+              </a:rPr>
+              <a:t>Sprache einstellen</a:t>
+            </a:r>
+          </a:p>
+          <a:p>
+            <a:r>
+              <a:rPr lang="de-AT" dirty="0">
+                <a:solidFill>
+                  <a:schemeClr val="bg1"/>
+                </a:solidFill>
+              </a:rPr>
+              <a:t>Chatfunktion</a:t>
+            </a:r>
+          </a:p>
+          <a:p>
+            <a:r>
+              <a:rPr lang="de-AT" dirty="0">
+                <a:solidFill>
+                  <a:schemeClr val="bg1"/>
+                </a:solidFill>
+              </a:rPr>
+              <a:t>Gruppen erstellen</a:t>
+            </a:r>
+          </a:p>
+          <a:p>
+            <a:endParaRPr lang="de-AT" dirty="0">
+              <a:solidFill>
+                <a:schemeClr val="bg1"/>
+              </a:solidFill>
+            </a:endParaRPr>
           </a:p>
         </p:txBody>
       </p:sp>
@@ -4122,6 +6217,469 @@
     <p:extLst>
       <p:ext uri="{BB962C8B-B14F-4D97-AF65-F5344CB8AC3E}">
         <p14:creationId xmlns:p14="http://schemas.microsoft.com/office/powerpoint/2010/main" val="3557903325"/>
+      </p:ext>
+    </p:extLst>
+  </p:cSld>
+  <p:clrMapOvr>
+    <a:masterClrMapping/>
+  </p:clrMapOvr>
+</p:sld>
+</file>
+
+<file path=ppt/slides/slide9.xml><?xml version="1.0" encoding="utf-8"?>
+<p:sld xmlns:a="http://schemas.openxmlformats.org/drawingml/2006/main" xmlns:r="http://schemas.openxmlformats.org/officeDocument/2006/relationships" xmlns:p="http://schemas.openxmlformats.org/presentationml/2006/main">
+  <p:cSld>
+    <p:spTree>
+      <p:nvGrpSpPr>
+        <p:cNvPr id="1" name=""/>
+        <p:cNvGrpSpPr/>
+        <p:nvPr/>
+      </p:nvGrpSpPr>
+      <p:grpSpPr>
+        <a:xfrm>
+          <a:off x="0" y="0"/>
+          <a:ext cx="0" cy="0"/>
+          <a:chOff x="0" y="0"/>
+          <a:chExt cx="0" cy="0"/>
+        </a:xfrm>
+      </p:grpSpPr>
+      <p:sp>
+        <p:nvSpPr>
+          <p:cNvPr id="2" name="Titel 1">
+            <a:extLst>
+              <a:ext uri="{FF2B5EF4-FFF2-40B4-BE49-F238E27FC236}">
+                <a16:creationId xmlns:a16="http://schemas.microsoft.com/office/drawing/2014/main" id="{F4708471-333D-46D7-A2B7-6AD50B5A42D0}"/>
+              </a:ext>
+            </a:extLst>
+          </p:cNvPr>
+          <p:cNvSpPr>
+            <a:spLocks noGrp="1"/>
+          </p:cNvSpPr>
+          <p:nvPr>
+            <p:ph type="title"/>
+          </p:nvPr>
+        </p:nvSpPr>
+        <p:spPr/>
+        <p:txBody>
+          <a:bodyPr>
+            <a:normAutofit/>
+          </a:bodyPr>
+          <a:lstStyle/>
+          <a:p>
+            <a:r>
+              <a:rPr lang="de-AT" dirty="0">
+                <a:solidFill>
+                  <a:schemeClr val="bg1"/>
+                </a:solidFill>
+              </a:rPr>
+              <a:t>Fun Facts!</a:t>
+            </a:r>
+          </a:p>
+        </p:txBody>
+      </p:sp>
+      <p:sp>
+        <p:nvSpPr>
+          <p:cNvPr id="3" name="Inhaltsplatzhalter 2">
+            <a:extLst>
+              <a:ext uri="{FF2B5EF4-FFF2-40B4-BE49-F238E27FC236}">
+                <a16:creationId xmlns:a16="http://schemas.microsoft.com/office/drawing/2014/main" id="{FE947BF0-5598-4CB4-A682-EA5BFA0D099A}"/>
+              </a:ext>
+            </a:extLst>
+          </p:cNvPr>
+          <p:cNvSpPr>
+            <a:spLocks noGrp="1"/>
+          </p:cNvSpPr>
+          <p:nvPr>
+            <p:ph idx="1"/>
+          </p:nvPr>
+        </p:nvSpPr>
+        <p:spPr/>
+        <p:txBody>
+          <a:bodyPr>
+            <a:normAutofit fontScale="85000" lnSpcReduction="10000"/>
+          </a:bodyPr>
+          <a:lstStyle/>
+          <a:p>
+            <a:r>
+              <a:rPr lang="de-AT" dirty="0" err="1">
+                <a:solidFill>
+                  <a:schemeClr val="bg1"/>
+                </a:solidFill>
+              </a:rPr>
+              <a:t>Commits</a:t>
+            </a:r>
+            <a:endParaRPr lang="de-AT" dirty="0">
+              <a:solidFill>
+                <a:schemeClr val="bg1"/>
+              </a:solidFill>
+            </a:endParaRPr>
+          </a:p>
+          <a:p>
+            <a:pPr lvl="1"/>
+            <a:r>
+              <a:rPr lang="de-AT" dirty="0">
+                <a:solidFill>
+                  <a:schemeClr val="bg1"/>
+                </a:solidFill>
+              </a:rPr>
+              <a:t>51</a:t>
+            </a:r>
+          </a:p>
+          <a:p>
+            <a:pPr lvl="1"/>
+            <a:r>
+              <a:rPr lang="de-AT" dirty="0">
+                <a:solidFill>
+                  <a:schemeClr val="bg1"/>
+                </a:solidFill>
+              </a:rPr>
+              <a:t>19 nach Mitternacht</a:t>
+            </a:r>
+          </a:p>
+          <a:p>
+            <a:pPr lvl="1"/>
+            <a:r>
+              <a:rPr lang="de-AT" dirty="0">
+                <a:solidFill>
+                  <a:schemeClr val="bg1"/>
+                </a:solidFill>
+              </a:rPr>
+              <a:t>25 im Jänner</a:t>
+            </a:r>
+          </a:p>
+          <a:p>
+            <a:r>
+              <a:rPr lang="de-AT" dirty="0">
+                <a:solidFill>
+                  <a:schemeClr val="bg1"/>
+                </a:solidFill>
+              </a:rPr>
+              <a:t>Code</a:t>
+            </a:r>
+          </a:p>
+          <a:p>
+            <a:pPr lvl="1"/>
+            <a:r>
+              <a:rPr lang="de-AT" dirty="0" err="1">
+                <a:solidFill>
+                  <a:schemeClr val="bg1"/>
+                </a:solidFill>
+              </a:rPr>
+              <a:t>Additions</a:t>
+            </a:r>
+            <a:r>
+              <a:rPr lang="de-AT" dirty="0">
+                <a:solidFill>
+                  <a:schemeClr val="bg1"/>
+                </a:solidFill>
+              </a:rPr>
+              <a:t>: 24254</a:t>
+            </a:r>
+          </a:p>
+          <a:p>
+            <a:pPr lvl="1"/>
+            <a:r>
+              <a:rPr lang="de-AT" dirty="0" err="1">
+                <a:solidFill>
+                  <a:schemeClr val="bg1"/>
+                </a:solidFill>
+              </a:rPr>
+              <a:t>Deletions</a:t>
+            </a:r>
+            <a:r>
+              <a:rPr lang="de-AT" dirty="0">
+                <a:solidFill>
+                  <a:schemeClr val="bg1"/>
+                </a:solidFill>
+              </a:rPr>
+              <a:t>: 6591</a:t>
+            </a:r>
+          </a:p>
+          <a:p>
+            <a:pPr lvl="1"/>
+            <a:r>
+              <a:rPr lang="de-AT" dirty="0">
+                <a:solidFill>
+                  <a:schemeClr val="bg1"/>
+                </a:solidFill>
+              </a:rPr>
+              <a:t>Zeilen Code: 17663</a:t>
+            </a:r>
+          </a:p>
+          <a:p>
+            <a:pPr lvl="1"/>
+            <a:r>
+              <a:rPr lang="en-US" b="1" dirty="0" err="1">
+                <a:solidFill>
+                  <a:schemeClr val="bg1"/>
+                </a:solidFill>
+              </a:rPr>
+              <a:t>Rekord</a:t>
+            </a:r>
+            <a:r>
+              <a:rPr lang="en-US" b="1" dirty="0">
+                <a:solidFill>
+                  <a:schemeClr val="bg1"/>
+                </a:solidFill>
+              </a:rPr>
+              <a:t>: 10,765 additions</a:t>
+            </a:r>
+            <a:r>
+              <a:rPr lang="en-US" dirty="0">
+                <a:solidFill>
+                  <a:schemeClr val="bg1"/>
+                </a:solidFill>
+              </a:rPr>
+              <a:t> and </a:t>
+            </a:r>
+            <a:r>
+              <a:rPr lang="en-US" b="1" dirty="0">
+                <a:solidFill>
+                  <a:schemeClr val="bg1"/>
+                </a:solidFill>
+              </a:rPr>
+              <a:t>2,717 deletions</a:t>
+            </a:r>
+            <a:r>
+              <a:rPr lang="en-US" dirty="0">
+                <a:solidFill>
+                  <a:schemeClr val="bg1"/>
+                </a:solidFill>
+              </a:rPr>
+              <a:t>.</a:t>
+            </a:r>
+          </a:p>
+          <a:p>
+            <a:r>
+              <a:rPr lang="en-US" dirty="0">
+                <a:solidFill>
+                  <a:schemeClr val="bg1"/>
+                </a:solidFill>
+              </a:rPr>
+              <a:t>Messages</a:t>
+            </a:r>
+          </a:p>
+          <a:p>
+            <a:pPr lvl="1"/>
+            <a:r>
+              <a:rPr lang="en-US" dirty="0">
+                <a:solidFill>
+                  <a:schemeClr val="bg1"/>
+                </a:solidFill>
+              </a:rPr>
+              <a:t>Florian: </a:t>
+            </a:r>
+            <a:r>
+              <a:rPr lang="en-US" dirty="0" err="1">
+                <a:solidFill>
+                  <a:schemeClr val="bg1"/>
+                </a:solidFill>
+              </a:rPr>
+              <a:t>Hauffenweiße</a:t>
+            </a:r>
+            <a:r>
+              <a:rPr lang="en-US" dirty="0">
+                <a:solidFill>
+                  <a:schemeClr val="bg1"/>
+                </a:solidFill>
+              </a:rPr>
+              <a:t> fixes | </a:t>
+            </a:r>
+            <a:r>
+              <a:rPr lang="en-US" dirty="0" err="1">
+                <a:solidFill>
+                  <a:schemeClr val="bg1"/>
+                </a:solidFill>
+              </a:rPr>
+              <a:t>bissl</a:t>
+            </a:r>
+            <a:r>
+              <a:rPr lang="en-US" dirty="0">
+                <a:solidFill>
+                  <a:schemeClr val="bg1"/>
+                </a:solidFill>
+              </a:rPr>
+              <a:t> feed, </a:t>
+            </a:r>
+            <a:r>
+              <a:rPr lang="en-US" dirty="0" err="1">
+                <a:solidFill>
+                  <a:schemeClr val="bg1"/>
+                </a:solidFill>
+              </a:rPr>
+              <a:t>bissl</a:t>
+            </a:r>
+            <a:r>
+              <a:rPr lang="en-US" dirty="0">
+                <a:solidFill>
+                  <a:schemeClr val="bg1"/>
+                </a:solidFill>
+              </a:rPr>
+              <a:t> </a:t>
+            </a:r>
+            <a:r>
+              <a:rPr lang="en-US" dirty="0" err="1">
+                <a:solidFill>
+                  <a:schemeClr val="bg1"/>
+                </a:solidFill>
+              </a:rPr>
+              <a:t>css</a:t>
+            </a:r>
+            <a:r>
+              <a:rPr lang="en-US" dirty="0">
+                <a:solidFill>
+                  <a:schemeClr val="bg1"/>
+                </a:solidFill>
+              </a:rPr>
+              <a:t>, </a:t>
+            </a:r>
+            <a:r>
+              <a:rPr lang="en-US" dirty="0" err="1">
+                <a:solidFill>
+                  <a:schemeClr val="bg1"/>
+                </a:solidFill>
+              </a:rPr>
+              <a:t>bissl</a:t>
+            </a:r>
+            <a:r>
+              <a:rPr lang="en-US" dirty="0">
+                <a:solidFill>
+                  <a:schemeClr val="bg1"/>
+                </a:solidFill>
+              </a:rPr>
+              <a:t> presentation</a:t>
+            </a:r>
+          </a:p>
+          <a:p>
+            <a:pPr lvl="1"/>
+            <a:r>
+              <a:rPr lang="en-US" dirty="0">
+                <a:solidFill>
+                  <a:schemeClr val="bg1"/>
+                </a:solidFill>
+              </a:rPr>
+              <a:t>Viktor: added test database for login system | </a:t>
+            </a:r>
+            <a:r>
+              <a:rPr lang="en-US" dirty="0" err="1">
+                <a:solidFill>
+                  <a:schemeClr val="bg1"/>
+                </a:solidFill>
+              </a:rPr>
+              <a:t>Letzter</a:t>
+            </a:r>
+            <a:r>
+              <a:rPr lang="en-US" dirty="0">
+                <a:solidFill>
+                  <a:schemeClr val="bg1"/>
+                </a:solidFill>
+              </a:rPr>
+              <a:t> </a:t>
+            </a:r>
+            <a:r>
+              <a:rPr lang="en-US" dirty="0" err="1">
+                <a:solidFill>
+                  <a:schemeClr val="bg1"/>
+                </a:solidFill>
+              </a:rPr>
+              <a:t>vor</a:t>
+            </a:r>
+            <a:r>
+              <a:rPr lang="en-US" dirty="0">
+                <a:solidFill>
+                  <a:schemeClr val="bg1"/>
+                </a:solidFill>
+              </a:rPr>
+              <a:t> </a:t>
+            </a:r>
+            <a:r>
+              <a:rPr lang="en-US" dirty="0" err="1">
+                <a:solidFill>
+                  <a:schemeClr val="bg1"/>
+                </a:solidFill>
+              </a:rPr>
+              <a:t>Weihnachten</a:t>
+            </a:r>
+            <a:r>
+              <a:rPr lang="en-US" dirty="0">
+                <a:solidFill>
+                  <a:schemeClr val="bg1"/>
+                </a:solidFill>
+              </a:rPr>
+              <a:t>, </a:t>
+            </a:r>
+            <a:r>
+              <a:rPr lang="en-US" dirty="0" err="1">
+                <a:solidFill>
+                  <a:schemeClr val="bg1"/>
+                </a:solidFill>
+              </a:rPr>
+              <a:t>Erster</a:t>
+            </a:r>
+            <a:r>
+              <a:rPr lang="en-US" dirty="0">
+                <a:solidFill>
+                  <a:schemeClr val="bg1"/>
+                </a:solidFill>
+              </a:rPr>
+              <a:t> </a:t>
+            </a:r>
+            <a:r>
+              <a:rPr lang="en-US" dirty="0" err="1">
+                <a:solidFill>
+                  <a:schemeClr val="bg1"/>
+                </a:solidFill>
+              </a:rPr>
+              <a:t>nach</a:t>
+            </a:r>
+            <a:r>
+              <a:rPr lang="en-US" dirty="0">
+                <a:solidFill>
+                  <a:schemeClr val="bg1"/>
+                </a:solidFill>
+              </a:rPr>
+              <a:t> Silvester</a:t>
+            </a:r>
+          </a:p>
+          <a:p>
+            <a:pPr lvl="1"/>
+            <a:r>
+              <a:rPr lang="en-US" dirty="0">
+                <a:solidFill>
+                  <a:schemeClr val="bg1"/>
+                </a:solidFill>
+              </a:rPr>
+              <a:t>Stefan: add, remove button yolo | </a:t>
+            </a:r>
+            <a:r>
+              <a:rPr lang="en-US" dirty="0" err="1">
+                <a:solidFill>
+                  <a:schemeClr val="bg1"/>
+                </a:solidFill>
+              </a:rPr>
+              <a:t>sdjfjsadf</a:t>
+            </a:r>
+            <a:endParaRPr lang="en-US" dirty="0">
+              <a:solidFill>
+                <a:schemeClr val="bg1"/>
+              </a:solidFill>
+            </a:endParaRPr>
+          </a:p>
+          <a:p>
+            <a:endParaRPr lang="en-US" dirty="0"/>
+          </a:p>
+          <a:p>
+            <a:pPr marL="0" indent="0">
+              <a:buNone/>
+            </a:pPr>
+            <a:endParaRPr lang="de-AT" dirty="0"/>
+          </a:p>
+        </p:txBody>
+      </p:sp>
+    </p:spTree>
+    <p:extLst>
+      <p:ext uri="{BB962C8B-B14F-4D97-AF65-F5344CB8AC3E}">
+        <p14:creationId xmlns:p14="http://schemas.microsoft.com/office/powerpoint/2010/main" val="599146595"/>
       </p:ext>
     </p:extLst>
   </p:cSld>

</xml_diff>